<commit_message>
Update docs and scripts
</commit_message>
<xml_diff>
--- a/docs/Docker-and-Kubernetes-on-AWS-QuickStart.pptx
+++ b/docs/Docker-and-Kubernetes-on-AWS-QuickStart.pptx
@@ -204,7 +204,7 @@
             <a:fld id="{814910AB-AEF0-414C-82CB-791080B1186B}" type="datetimeFigureOut">
               <a:rPr lang="en-US" smtClean="0"/>
               <a:pPr/>
-              <a:t>9/28/2016</a:t>
+              <a:t>10/21/2016</a:t>
             </a:fld>
             <a:endParaRPr lang="en-US" dirty="0"/>
           </a:p>
@@ -366,7 +366,7 @@
             <a:fld id="{5B4AE38D-E020-46F3-803D-8636C5B7B74E}" type="datetimeFigureOut">
               <a:rPr lang="en-US" smtClean="0"/>
               <a:pPr/>
-              <a:t>9/28/2016</a:t>
+              <a:t>10/21/2016</a:t>
             </a:fld>
             <a:endParaRPr lang="en-US" dirty="0"/>
           </a:p>
@@ -939,7 +939,7 @@
             <a:fld id="{7DDB771E-4AED-4DD3-8AA1-5D9FD2224F14}" type="datetimeFigureOut">
               <a:rPr lang="en-US" smtClean="0"/>
               <a:pPr/>
-              <a:t>9/28/2016</a:t>
+              <a:t>10/21/2016</a:t>
             </a:fld>
             <a:endParaRPr lang="en-US" dirty="0"/>
           </a:p>
@@ -1106,7 +1106,7 @@
             <a:fld id="{7DDB771E-4AED-4DD3-8AA1-5D9FD2224F14}" type="datetimeFigureOut">
               <a:rPr lang="en-US" smtClean="0"/>
               <a:pPr/>
-              <a:t>9/28/2016</a:t>
+              <a:t>10/21/2016</a:t>
             </a:fld>
             <a:endParaRPr lang="en-US" dirty="0"/>
           </a:p>
@@ -1283,7 +1283,7 @@
             <a:fld id="{7DDB771E-4AED-4DD3-8AA1-5D9FD2224F14}" type="datetimeFigureOut">
               <a:rPr lang="en-US" smtClean="0"/>
               <a:pPr/>
-              <a:t>9/28/2016</a:t>
+              <a:t>10/21/2016</a:t>
             </a:fld>
             <a:endParaRPr lang="en-US" dirty="0"/>
           </a:p>
@@ -1450,7 +1450,7 @@
             <a:fld id="{7DDB771E-4AED-4DD3-8AA1-5D9FD2224F14}" type="datetimeFigureOut">
               <a:rPr lang="en-US" smtClean="0"/>
               <a:pPr/>
-              <a:t>9/28/2016</a:t>
+              <a:t>10/21/2016</a:t>
             </a:fld>
             <a:endParaRPr lang="en-US" dirty="0"/>
           </a:p>
@@ -1693,7 +1693,7 @@
             <a:fld id="{7DDB771E-4AED-4DD3-8AA1-5D9FD2224F14}" type="datetimeFigureOut">
               <a:rPr lang="en-US" smtClean="0"/>
               <a:pPr/>
-              <a:t>9/28/2016</a:t>
+              <a:t>10/21/2016</a:t>
             </a:fld>
             <a:endParaRPr lang="en-US" dirty="0"/>
           </a:p>
@@ -1978,7 +1978,7 @@
             <a:fld id="{7DDB771E-4AED-4DD3-8AA1-5D9FD2224F14}" type="datetimeFigureOut">
               <a:rPr lang="en-US" smtClean="0"/>
               <a:pPr/>
-              <a:t>9/28/2016</a:t>
+              <a:t>10/21/2016</a:t>
             </a:fld>
             <a:endParaRPr lang="en-US" dirty="0"/>
           </a:p>
@@ -2397,7 +2397,7 @@
             <a:fld id="{7DDB771E-4AED-4DD3-8AA1-5D9FD2224F14}" type="datetimeFigureOut">
               <a:rPr lang="en-US" smtClean="0"/>
               <a:pPr/>
-              <a:t>9/28/2016</a:t>
+              <a:t>10/21/2016</a:t>
             </a:fld>
             <a:endParaRPr lang="en-US" dirty="0"/>
           </a:p>
@@ -2512,7 +2512,7 @@
             <a:fld id="{7DDB771E-4AED-4DD3-8AA1-5D9FD2224F14}" type="datetimeFigureOut">
               <a:rPr lang="en-US" smtClean="0"/>
               <a:pPr/>
-              <a:t>9/28/2016</a:t>
+              <a:t>10/21/2016</a:t>
             </a:fld>
             <a:endParaRPr lang="en-US" dirty="0"/>
           </a:p>
@@ -2604,7 +2604,7 @@
             <a:fld id="{7DDB771E-4AED-4DD3-8AA1-5D9FD2224F14}" type="datetimeFigureOut">
               <a:rPr lang="en-US" smtClean="0"/>
               <a:pPr/>
-              <a:t>9/28/2016</a:t>
+              <a:t>10/21/2016</a:t>
             </a:fld>
             <a:endParaRPr lang="en-US" dirty="0"/>
           </a:p>
@@ -2878,7 +2878,7 @@
             <a:fld id="{7DDB771E-4AED-4DD3-8AA1-5D9FD2224F14}" type="datetimeFigureOut">
               <a:rPr lang="en-US" smtClean="0"/>
               <a:pPr/>
-              <a:t>9/28/2016</a:t>
+              <a:t>10/21/2016</a:t>
             </a:fld>
             <a:endParaRPr lang="en-US" dirty="0"/>
           </a:p>
@@ -3128,7 +3128,7 @@
             <a:fld id="{7DDB771E-4AED-4DD3-8AA1-5D9FD2224F14}" type="datetimeFigureOut">
               <a:rPr lang="en-US" smtClean="0"/>
               <a:pPr/>
-              <a:t>9/28/2016</a:t>
+              <a:t>10/21/2016</a:t>
             </a:fld>
             <a:endParaRPr lang="en-US" dirty="0"/>
           </a:p>
@@ -3338,7 +3338,7 @@
             <a:fld id="{7DDB771E-4AED-4DD3-8AA1-5D9FD2224F14}" type="datetimeFigureOut">
               <a:rPr lang="en-US" smtClean="0"/>
               <a:pPr/>
-              <a:t>9/28/2016</a:t>
+              <a:t>10/21/2016</a:t>
             </a:fld>
             <a:endParaRPr lang="en-US" dirty="0"/>
           </a:p>
@@ -3718,7 +3718,7 @@
         <p:spPr>
           <a:xfrm>
             <a:off x="3092723" y="3828874"/>
-            <a:ext cx="2703432" cy="646331"/>
+            <a:ext cx="2703432" cy="923330"/>
           </a:xfrm>
           <a:prstGeom prst="rect">
             <a:avLst/>
@@ -3735,6 +3735,13 @@
             <a:r>
               <a:rPr lang="en-US" dirty="0" smtClean="0"/>
               <a:t>kirk.kalvar@kal.technology</a:t>
+            </a:r>
+          </a:p>
+          <a:p>
+            <a:pPr algn="ctr"/>
+            <a:r>
+              <a:rPr lang="en-US" dirty="0" smtClean="0"/>
+              <a:t>@kskalvar</a:t>
             </a:r>
           </a:p>
           <a:p>
@@ -3782,7 +3789,7 @@
         <p:spPr>
           <a:xfrm>
             <a:off x="1610687" y="738230"/>
-            <a:ext cx="5704513" cy="746201"/>
+            <a:ext cx="5704513" cy="1434699"/>
           </a:xfrm>
           <a:prstGeom prst="rect">
             <a:avLst/>
@@ -3790,7 +3797,7 @@
         </p:spPr>
         <p:txBody>
           <a:bodyPr anchor="b">
-            <a:normAutofit fontScale="55000" lnSpcReduction="20000"/>
+            <a:noAutofit/>
           </a:bodyPr>
           <a:lstStyle/>
           <a:p>
@@ -3812,31 +3819,17 @@
               <a:defRPr/>
             </a:pPr>
             <a:r>
-              <a:rPr lang="en-US" sz="4300" dirty="0" smtClean="0">
-                <a:effectLst>
-                  <a:outerShdw blurRad="50000" dist="30000" dir="5400000" algn="tl" rotWithShape="0">
-                    <a:srgbClr val="000000">
-                      <a:alpha val="30000"/>
-                    </a:srgbClr>
-                  </a:outerShdw>
-                </a:effectLst>
+              <a:rPr lang="en-US" sz="4000" dirty="0" smtClean="0">
                 <a:latin typeface="+mj-lt"/>
                 <a:ea typeface="+mj-ea"/>
                 <a:cs typeface="+mj-cs"/>
               </a:rPr>
               <a:t>Docker and Kubernetes on AWS QuickStart</a:t>
             </a:r>
-            <a:endParaRPr kumimoji="0" lang="en-US" sz="4300" b="0" i="0" u="none" strike="noStrike" kern="1200" cap="none" spc="0" normalizeH="0" baseline="0" noProof="0" dirty="0">
+            <a:endParaRPr kumimoji="0" lang="en-US" sz="4000" b="0" i="0" u="none" strike="noStrike" kern="1200" cap="none" spc="0" normalizeH="0" baseline="0" noProof="0" dirty="0">
               <a:ln>
                 <a:noFill/>
               </a:ln>
-              <a:effectLst>
-                <a:outerShdw blurRad="50000" dist="30000" dir="5400000" algn="tl" rotWithShape="0">
-                  <a:srgbClr val="000000">
-                    <a:alpha val="30000"/>
-                  </a:srgbClr>
-                </a:outerShdw>
-              </a:effectLst>
               <a:uLnTx/>
               <a:uFillTx/>
               <a:latin typeface="+mj-lt"/>
@@ -4098,7 +4091,15 @@
             </a:pPr>
             <a:r>
               <a:rPr lang="en-US" dirty="0" smtClean="0"/>
-              <a:t>  Have Limited Resources</a:t>
+              <a:t>  Have </a:t>
+            </a:r>
+            <a:r>
+              <a:rPr lang="en-US" dirty="0" smtClean="0"/>
+              <a:t>limited </a:t>
+            </a:r>
+            <a:r>
+              <a:rPr lang="en-US" dirty="0" smtClean="0"/>
+              <a:t>Resources</a:t>
             </a:r>
           </a:p>
         </p:txBody>
@@ -4362,7 +4363,7 @@
         </p:nvSpPr>
         <p:spPr>
           <a:xfrm>
-            <a:off x="751918" y="3213880"/>
+            <a:off x="545446" y="3213880"/>
             <a:ext cx="1295400" cy="1981200"/>
           </a:xfrm>
           <a:prstGeom prst="rect">
@@ -4399,7 +4400,7 @@
                   <a:schemeClr val="tx1"/>
                 </a:solidFill>
               </a:rPr>
-              <a:t>Docker </a:t>
+              <a:t>docker </a:t>
             </a:r>
           </a:p>
           <a:p>
@@ -4410,7 +4411,7 @@
                   <a:schemeClr val="tx1"/>
                 </a:solidFill>
               </a:rPr>
-              <a:t>Kubectl </a:t>
+              <a:t>kubectl </a:t>
             </a:r>
           </a:p>
           <a:p>
@@ -4421,7 +4422,7 @@
                   <a:schemeClr val="tx1"/>
                 </a:solidFill>
               </a:rPr>
-              <a:t>AWS Tools</a:t>
+              <a:t>aws client </a:t>
             </a:r>
             <a:endParaRPr lang="en-US" dirty="0">
               <a:solidFill>
@@ -4506,8 +4507,8 @@
         </p:nvSpPr>
         <p:spPr>
           <a:xfrm>
-            <a:off x="775373" y="2868527"/>
-            <a:ext cx="1285608" cy="369332"/>
+            <a:off x="313269" y="2868527"/>
+            <a:ext cx="1666162" cy="338554"/>
           </a:xfrm>
           <a:prstGeom prst="rect">
             <a:avLst/>
@@ -4521,10 +4522,10 @@
           <a:lstStyle/>
           <a:p>
             <a:r>
-              <a:rPr lang="en-US" dirty="0" smtClean="0"/>
-              <a:t>k8s-console</a:t>
-            </a:r>
-            <a:endParaRPr lang="en-US" dirty="0"/>
+              <a:rPr lang="en-US" sz="1600" dirty="0" smtClean="0"/>
+              <a:t>amazon-linux-ami</a:t>
+            </a:r>
+            <a:endParaRPr lang="en-US" sz="1600" dirty="0"/>
           </a:p>
         </p:txBody>
       </p:sp>
@@ -4644,7 +4645,7 @@
         <p:spPr>
           <a:xfrm>
             <a:off x="482367" y="283027"/>
-            <a:ext cx="8229600" cy="1143000"/>
+            <a:ext cx="8229600" cy="867347"/>
           </a:xfrm>
         </p:spPr>
         <p:txBody>
@@ -4800,7 +4801,7 @@
         </p:nvGrpSpPr>
         <p:grpSpPr>
           <a:xfrm>
-            <a:off x="896979" y="1200495"/>
+            <a:off x="218896" y="1128576"/>
             <a:ext cx="1981200" cy="684950"/>
             <a:chOff x="3338175" y="1569089"/>
             <a:chExt cx="1981200" cy="955997"/>
@@ -4918,8 +4919,8 @@
         </p:nvGrpSpPr>
         <p:grpSpPr>
           <a:xfrm>
-            <a:off x="6090349" y="1218373"/>
-            <a:ext cx="1981200" cy="699439"/>
+            <a:off x="6778707" y="1218375"/>
+            <a:ext cx="1981200" cy="699440"/>
             <a:chOff x="4983818" y="1453041"/>
             <a:chExt cx="1981200" cy="955997"/>
           </a:xfrm>
@@ -4975,8 +4976,8 @@
           </p:nvSpPr>
           <p:spPr>
             <a:xfrm>
-              <a:off x="5216397" y="1733565"/>
-              <a:ext cx="1549655" cy="369332"/>
+              <a:off x="5216397" y="1733564"/>
+              <a:ext cx="1442318" cy="504805"/>
             </a:xfrm>
             <a:prstGeom prst="rect">
               <a:avLst/>
@@ -4991,7 +4992,7 @@
             <a:p>
               <a:r>
                 <a:rPr lang="en-US" dirty="0" smtClean="0"/>
-                <a:t>Client Browser</a:t>
+                <a:t>Web Browser</a:t>
               </a:r>
               <a:endParaRPr lang="en-US" dirty="0"/>
             </a:p>
@@ -5143,61 +5144,6 @@
       </p:sp>
       <p:sp>
         <p:nvSpPr>
-          <p:cNvPr id="34" name="Rectangle 33"/>
-          <p:cNvSpPr/>
-          <p:nvPr/>
-        </p:nvSpPr>
-        <p:spPr>
-          <a:xfrm>
-            <a:off x="3935833" y="3802506"/>
-            <a:ext cx="1191237" cy="402672"/>
-          </a:xfrm>
-          <a:prstGeom prst="rect">
-            <a:avLst/>
-          </a:prstGeom>
-          <a:solidFill>
-            <a:srgbClr val="FFC000"/>
-          </a:solidFill>
-        </p:spPr>
-        <p:style>
-          <a:lnRef idx="2">
-            <a:schemeClr val="accent1">
-              <a:shade val="50000"/>
-            </a:schemeClr>
-          </a:lnRef>
-          <a:fillRef idx="1">
-            <a:schemeClr val="accent1"/>
-          </a:fillRef>
-          <a:effectRef idx="0">
-            <a:schemeClr val="accent1"/>
-          </a:effectRef>
-          <a:fontRef idx="minor">
-            <a:schemeClr val="lt1"/>
-          </a:fontRef>
-        </p:style>
-        <p:txBody>
-          <a:bodyPr rtlCol="0" anchor="ctr"/>
-          <a:lstStyle/>
-          <a:p>
-            <a:pPr algn="ctr"/>
-            <a:r>
-              <a:rPr lang="en-US" dirty="0" smtClean="0">
-                <a:solidFill>
-                  <a:schemeClr val="tx1"/>
-                </a:solidFill>
-              </a:rPr>
-              <a:t>Web</a:t>
-            </a:r>
-            <a:endParaRPr lang="en-US" dirty="0">
-              <a:solidFill>
-                <a:schemeClr val="tx1"/>
-              </a:solidFill>
-            </a:endParaRPr>
-          </a:p>
-        </p:txBody>
-      </p:sp>
-      <p:sp>
-        <p:nvSpPr>
           <p:cNvPr id="35" name="Rectangle 34"/>
           <p:cNvSpPr/>
           <p:nvPr/>
@@ -5472,8 +5418,8 @@
         </p:nvSpPr>
         <p:spPr>
           <a:xfrm>
-            <a:off x="2312377" y="5331303"/>
-            <a:ext cx="1563434" cy="672987"/>
+            <a:off x="2204225" y="5331303"/>
+            <a:ext cx="5573312" cy="672987"/>
           </a:xfrm>
           <a:prstGeom prst="rect">
             <a:avLst/>
@@ -5509,20 +5455,59 @@
                   <a:schemeClr val="tx1"/>
                 </a:solidFill>
               </a:rPr>
-              <a:t>EC2 Volume </a:t>
-            </a:r>
-          </a:p>
+              <a:t>EC2 Volumes </a:t>
+            </a:r>
+          </a:p>
+        </p:txBody>
+      </p:sp>
+      <p:sp>
+        <p:nvSpPr>
+          <p:cNvPr id="43" name="Rectangle 42"/>
+          <p:cNvSpPr/>
+          <p:nvPr/>
+        </p:nvSpPr>
+        <p:spPr>
+          <a:xfrm>
+            <a:off x="2530575" y="5392174"/>
+            <a:ext cx="1161759" cy="536015"/>
+          </a:xfrm>
+          <a:prstGeom prst="rect">
+            <a:avLst/>
+          </a:prstGeom>
+          <a:solidFill>
+            <a:schemeClr val="bg1"/>
+          </a:solidFill>
+        </p:spPr>
+        <p:style>
+          <a:lnRef idx="2">
+            <a:schemeClr val="accent1">
+              <a:shade val="50000"/>
+            </a:schemeClr>
+          </a:lnRef>
+          <a:fillRef idx="1">
+            <a:schemeClr val="accent1"/>
+          </a:fillRef>
+          <a:effectRef idx="0">
+            <a:schemeClr val="accent1"/>
+          </a:effectRef>
+          <a:fontRef idx="minor">
+            <a:schemeClr val="lt1"/>
+          </a:fontRef>
+        </p:style>
+        <p:txBody>
+          <a:bodyPr rtlCol="0" anchor="ctr"/>
+          <a:lstStyle/>
           <a:p>
             <a:pPr algn="ctr"/>
             <a:r>
-              <a:rPr lang="en-US" dirty="0" smtClean="0">
+              <a:rPr lang="en-US" sz="1300" dirty="0" smtClean="0">
                 <a:solidFill>
                   <a:schemeClr val="tx1"/>
                 </a:solidFill>
               </a:rPr>
               <a:t>k8s-master-pd</a:t>
             </a:r>
-            <a:endParaRPr lang="en-US" dirty="0">
+            <a:endParaRPr lang="en-US" sz="1300" dirty="0">
               <a:solidFill>
                 <a:schemeClr val="tx1"/>
               </a:solidFill>
@@ -5617,8 +5602,8 @@
         </p:nvSpPr>
         <p:spPr>
           <a:xfrm>
-            <a:off x="1263242" y="1572798"/>
-            <a:ext cx="6705600" cy="4801314"/>
+            <a:off x="1263242" y="1367318"/>
+            <a:ext cx="6705600" cy="3970318"/>
           </a:xfrm>
           <a:prstGeom prst="rect">
             <a:avLst/>
@@ -5633,32 +5618,7 @@
           <a:p>
             <a:r>
               <a:rPr lang="en-US" dirty="0" smtClean="0"/>
-              <a:t>The k8s-console is not part of the cluster it’s used for cluster configuration and </a:t>
-            </a:r>
-            <a:r>
-              <a:rPr lang="en-US" dirty="0" smtClean="0"/>
-              <a:t>to run </a:t>
-            </a:r>
-            <a:r>
-              <a:rPr lang="en-US" smtClean="0"/>
-              <a:t>kubectl </a:t>
-            </a:r>
-            <a:r>
-              <a:rPr lang="en-US" smtClean="0"/>
-              <a:t>cluster commands</a:t>
-            </a:r>
-            <a:r>
-              <a:rPr lang="en-US" dirty="0" smtClean="0"/>
-              <a:t>.</a:t>
-            </a:r>
-          </a:p>
-          <a:p>
-            <a:endParaRPr lang="en-US" dirty="0" smtClean="0"/>
-          </a:p>
-          <a:p>
-            <a:r>
-              <a:rPr lang="en-US" dirty="0" smtClean="0"/>
-              <a:t># configure aws cli</a:t>
+              <a:t># configure aws client tools</a:t>
             </a:r>
           </a:p>
           <a:p>
@@ -5673,7 +5633,15 @@
           <a:p>
             <a:r>
               <a:rPr lang="en-US" dirty="0" smtClean="0"/>
-              <a:t># environment variables</a:t>
+              <a:t># </a:t>
+            </a:r>
+            <a:r>
+              <a:rPr lang="en-US" smtClean="0"/>
+              <a:t>set kubernetes environment </a:t>
+            </a:r>
+            <a:r>
+              <a:rPr lang="en-US" dirty="0" smtClean="0"/>
+              <a:t>variables</a:t>
             </a:r>
           </a:p>
           <a:p>
@@ -5823,7 +5791,7 @@
         <p:spPr>
           <a:xfrm>
             <a:off x="857123" y="2024775"/>
-            <a:ext cx="7515090" cy="1754326"/>
+            <a:ext cx="7515090" cy="2308324"/>
           </a:xfrm>
           <a:prstGeom prst="rect">
             <a:avLst/>
@@ -5842,8 +5810,11 @@
             </a:pPr>
             <a:r>
               <a:rPr lang="en-US" dirty="0" smtClean="0"/>
-              <a:t>  To save time the k8s-console and kubernetes cluster are already configured</a:t>
-            </a:r>
+              <a:t>  To save time the amazon-linux-ami and the kubernetes cluster are already configured and running</a:t>
+            </a:r>
+          </a:p>
+          <a:p>
+            <a:endParaRPr lang="en-US" dirty="0" smtClean="0"/>
           </a:p>
           <a:p>
             <a:pPr>
@@ -5872,7 +5843,7 @@
             </a:pPr>
             <a:r>
               <a:rPr lang="en-US" dirty="0" smtClean="0"/>
-              <a:t>  Run the container in the cluster and create two replicas</a:t>
+              <a:t>  Run the container in the cluster and request two replicas</a:t>
             </a:r>
           </a:p>
           <a:p>
@@ -6018,7 +5989,7 @@
         </p:nvSpPr>
         <p:spPr>
           <a:xfrm>
-            <a:off x="1435608" y="274320"/>
+            <a:off x="891086" y="274320"/>
             <a:ext cx="7498080" cy="1143000"/>
           </a:xfrm>
           <a:prstGeom prst="rect">
@@ -6031,7 +6002,7 @@
           </a:bodyPr>
           <a:lstStyle/>
           <a:p>
-            <a:pPr marL="0" marR="0" lvl="0" indent="0" algn="l" defTabSz="914400" rtl="0" eaLnBrk="1" fontAlgn="auto" latinLnBrk="0" hangingPunct="1">
+            <a:pPr marL="0" marR="0" lvl="0" indent="0" algn="ctr" defTabSz="914400" rtl="0" eaLnBrk="1" fontAlgn="auto" latinLnBrk="0" hangingPunct="1">
               <a:lnSpc>
                 <a:spcPct val="100000"/>
               </a:lnSpc>
@@ -6049,41 +6020,17 @@
               <a:defRPr/>
             </a:pPr>
             <a:r>
-              <a:rPr lang="en-US" sz="4300" dirty="0" smtClean="0">
-                <a:solidFill>
-                  <a:schemeClr val="tx2">
-                    <a:satMod val="130000"/>
-                  </a:schemeClr>
-                </a:solidFill>
-                <a:effectLst>
-                  <a:outerShdw blurRad="50000" dist="30000" dir="5400000" algn="tl" rotWithShape="0">
-                    <a:srgbClr val="000000">
-                      <a:alpha val="30000"/>
-                    </a:srgbClr>
-                  </a:outerShdw>
-                </a:effectLst>
+              <a:rPr lang="en-US" sz="4400" dirty="0" smtClean="0">
                 <a:latin typeface="+mj-lt"/>
                 <a:ea typeface="+mj-ea"/>
                 <a:cs typeface="+mj-cs"/>
               </a:rPr>
               <a:t>References</a:t>
             </a:r>
-            <a:endParaRPr kumimoji="0" lang="en-US" sz="4300" b="0" i="0" u="none" strike="noStrike" kern="1200" cap="none" spc="0" normalizeH="0" baseline="0" noProof="0" dirty="0">
+            <a:endParaRPr kumimoji="0" lang="en-US" sz="4400" b="0" i="0" u="none" strike="noStrike" kern="1200" cap="none" spc="0" normalizeH="0" baseline="0" noProof="0" dirty="0">
               <a:ln>
                 <a:noFill/>
               </a:ln>
-              <a:solidFill>
-                <a:schemeClr val="tx2">
-                  <a:satMod val="130000"/>
-                </a:schemeClr>
-              </a:solidFill>
-              <a:effectLst>
-                <a:outerShdw blurRad="50000" dist="30000" dir="5400000" algn="tl" rotWithShape="0">
-                  <a:srgbClr val="000000">
-                    <a:alpha val="30000"/>
-                  </a:srgbClr>
-                </a:outerShdw>
-              </a:effectLst>
               <a:uLnTx/>
               <a:uFillTx/>
               <a:latin typeface="+mj-lt"/>
@@ -6141,7 +6088,7 @@
             </a:pPr>
             <a:r>
               <a:rPr lang="en-US" dirty="0" smtClean="0"/>
-              <a:t> http://kubernetes.io/</a:t>
+              <a:t> kubernetes.io</a:t>
             </a:r>
           </a:p>
         </p:txBody>

</xml_diff>